<commit_message>
Added some pictures into PPT - This was the version we used!
</commit_message>
<xml_diff>
--- a/Documentatie/IoT.pptx
+++ b/Documentatie/IoT.pptx
@@ -526,29 +526,6 @@
               <a:rPr lang="nl-BE" dirty="0" smtClean="0"/>
               <a:t>Bart</a:t>
             </a:r>
-          </a:p>
-          <a:p>
-            <a:endParaRPr lang="nl-BE" dirty="0" smtClean="0"/>
-          </a:p>
-          <a:p>
-            <a:r>
-              <a:rPr lang="nl-BE" dirty="0" smtClean="0"/>
-              <a:t>Goedemorgen, mijn collega's en ik gaan u een presentatie geven over ons project </a:t>
-            </a:r>
-            <a:r>
-              <a:rPr lang="nl-BE" dirty="0" err="1" smtClean="0"/>
-              <a:t>Quit</a:t>
-            </a:r>
-            <a:r>
-              <a:rPr lang="nl-BE" dirty="0" smtClean="0"/>
-              <a:t> time.</a:t>
-            </a:r>
-          </a:p>
-          <a:p>
-            <a:r>
-              <a:rPr lang="nl-BE" dirty="0" smtClean="0"/>
-              <a:t>Veel luisterplezier en demo op het einde. </a:t>
-            </a:r>
             <a:endParaRPr lang="en-GB" dirty="0"/>
           </a:p>
         </p:txBody>
@@ -1794,184 +1771,9 @@
           <a:lstStyle/>
           <a:p>
             <a:r>
-              <a:rPr lang="nl-BE" smtClean="0"/>
-              <a:t> Bart</a:t>
-            </a:r>
-          </a:p>
-          <a:p>
-            <a:endParaRPr lang="nl-BE" dirty="0" smtClean="0"/>
-          </a:p>
-          <a:p>
-            <a:r>
               <a:rPr lang="nl-BE" dirty="0" smtClean="0"/>
-              <a:t>Om de </a:t>
-            </a:r>
-            <a:r>
-              <a:rPr lang="nl-BE" dirty="0" err="1" smtClean="0"/>
-              <a:t>heatmap</a:t>
-            </a:r>
-            <a:r>
-              <a:rPr lang="nl-BE" dirty="0" smtClean="0"/>
-              <a:t> te visualiseren heb ik gebruik gemaakt van een javascript </a:t>
-            </a:r>
-            <a:r>
-              <a:rPr lang="nl-BE" dirty="0" err="1" smtClean="0"/>
-              <a:t>libray</a:t>
-            </a:r>
-            <a:r>
-              <a:rPr lang="nl-BE" dirty="0" smtClean="0"/>
-              <a:t> genaamd heatmap.js. </a:t>
-            </a:r>
-          </a:p>
-          <a:p>
-            <a:r>
-              <a:rPr lang="nl-BE" dirty="0" smtClean="0"/>
-              <a:t>In onze html stellen we een afbeelding van </a:t>
-            </a:r>
-            <a:r>
-              <a:rPr lang="nl-BE" dirty="0" err="1" smtClean="0"/>
-              <a:t>van</a:t>
-            </a:r>
-            <a:r>
-              <a:rPr lang="nl-BE" dirty="0" smtClean="0"/>
-              <a:t> een bepaalde grootte. Hierover komt de </a:t>
-            </a:r>
-            <a:r>
-              <a:rPr lang="nl-BE" dirty="0" err="1" smtClean="0"/>
-              <a:t>heatmap</a:t>
-            </a:r>
-            <a:r>
-              <a:rPr lang="nl-BE" dirty="0" smtClean="0"/>
-              <a:t> terecht met dezelfde grootte als de html afbeelding.</a:t>
-            </a:r>
-          </a:p>
-          <a:p>
-            <a:endParaRPr lang="nl-BE" dirty="0" smtClean="0"/>
-          </a:p>
-          <a:p>
-            <a:r>
-              <a:rPr lang="nl-BE" dirty="0" smtClean="0"/>
-              <a:t>Eerst hebben we de sensor objecten in het </a:t>
-            </a:r>
-            <a:r>
-              <a:rPr lang="nl-BE" dirty="0" err="1" smtClean="0"/>
-              <a:t>preogramma</a:t>
-            </a:r>
-            <a:r>
-              <a:rPr lang="nl-BE" dirty="0" smtClean="0"/>
-              <a:t> gestoken met een ID, x en y. Deze hebben ook een </a:t>
-            </a:r>
-            <a:r>
-              <a:rPr lang="nl-BE" dirty="0" err="1" smtClean="0"/>
-              <a:t>value</a:t>
-            </a:r>
-            <a:r>
-              <a:rPr lang="nl-BE" dirty="0" smtClean="0"/>
-              <a:t>.</a:t>
-            </a:r>
-          </a:p>
-          <a:p>
-            <a:r>
-              <a:rPr lang="nl-BE" dirty="0" smtClean="0"/>
-              <a:t>Deze </a:t>
-            </a:r>
-            <a:r>
-              <a:rPr lang="nl-BE" dirty="0" err="1" smtClean="0"/>
-              <a:t>value</a:t>
-            </a:r>
-            <a:r>
-              <a:rPr lang="nl-BE" dirty="0" smtClean="0"/>
-              <a:t> halen we binnen via </a:t>
-            </a:r>
-            <a:r>
-              <a:rPr lang="nl-BE" dirty="0" err="1" smtClean="0"/>
-              <a:t>eem</a:t>
-            </a:r>
-            <a:r>
-              <a:rPr lang="nl-BE" dirty="0" smtClean="0"/>
-              <a:t> </a:t>
-            </a:r>
-            <a:r>
-              <a:rPr lang="nl-BE" dirty="0" err="1" smtClean="0"/>
-              <a:t>ajax</a:t>
-            </a:r>
-            <a:r>
-              <a:rPr lang="nl-BE" dirty="0" smtClean="0"/>
-              <a:t> voor een </a:t>
-            </a:r>
-            <a:r>
-              <a:rPr lang="nl-BE" dirty="0" err="1" smtClean="0"/>
-              <a:t>jsonp</a:t>
-            </a:r>
-            <a:r>
-              <a:rPr lang="nl-BE" dirty="0" smtClean="0"/>
-              <a:t> call naar de server. We doen dit in </a:t>
-            </a:r>
-            <a:r>
-              <a:rPr lang="nl-BE" dirty="0" err="1" smtClean="0"/>
-              <a:t>jsonp</a:t>
-            </a:r>
-            <a:r>
-              <a:rPr lang="nl-BE" dirty="0" smtClean="0"/>
-              <a:t> formaat voor cross-site </a:t>
-            </a:r>
-            <a:r>
-              <a:rPr lang="nl-BE" dirty="0" err="1" smtClean="0"/>
-              <a:t>scripting</a:t>
-            </a:r>
-            <a:r>
-              <a:rPr lang="nl-BE" dirty="0" smtClean="0"/>
-              <a:t> beveiliging te vermijden.</a:t>
-            </a:r>
-          </a:p>
-          <a:p>
-            <a:r>
-              <a:rPr lang="nl-BE" dirty="0" smtClean="0"/>
-              <a:t>De </a:t>
-            </a:r>
-            <a:r>
-              <a:rPr lang="nl-BE" dirty="0" err="1" smtClean="0"/>
-              <a:t>jsonp</a:t>
-            </a:r>
-            <a:r>
-              <a:rPr lang="nl-BE" dirty="0" smtClean="0"/>
-              <a:t> file bevat een ID en een </a:t>
-            </a:r>
-            <a:r>
-              <a:rPr lang="nl-BE" dirty="0" err="1" smtClean="0"/>
-              <a:t>value</a:t>
-            </a:r>
-            <a:r>
-              <a:rPr lang="nl-BE" dirty="0" smtClean="0"/>
-              <a:t>.</a:t>
-            </a:r>
-          </a:p>
-          <a:p>
-            <a:endParaRPr lang="nl-BE" dirty="0" smtClean="0"/>
-          </a:p>
-          <a:p>
-            <a:r>
-              <a:rPr lang="nl-BE" dirty="0" smtClean="0"/>
-              <a:t>Afhankelijk van de ID kunnen we de </a:t>
-            </a:r>
-            <a:r>
-              <a:rPr lang="nl-BE" dirty="0" err="1" smtClean="0"/>
-              <a:t>jusite</a:t>
-            </a:r>
-            <a:r>
-              <a:rPr lang="nl-BE" dirty="0" smtClean="0"/>
-              <a:t> </a:t>
-            </a:r>
-            <a:r>
-              <a:rPr lang="nl-BE" dirty="0" err="1" smtClean="0"/>
-              <a:t>value</a:t>
-            </a:r>
-            <a:r>
-              <a:rPr lang="nl-BE" dirty="0" smtClean="0"/>
-              <a:t> aan de correcte sensor kopellen.</a:t>
-            </a:r>
-          </a:p>
-          <a:p>
+              <a:t>Bart</a:t>
+            </a:r>
             <a:endParaRPr lang="en-GB" dirty="0"/>
           </a:p>
         </p:txBody>
@@ -2107,7 +1909,7 @@
           <a:effectLst/>
           <a:extLst>
             <a:ext uri="{91240B29-F687-4f45-9708-019B960494DF}">
-              <a14:hiddenLine xmlns="" xmlns:a14="http://schemas.microsoft.com/office/drawing/2010/main" w="9525">
+              <a14:hiddenLine xmlns:a14="http://schemas.microsoft.com/office/drawing/2010/main" xmlns="" w="9525">
                 <a:solidFill>
                   <a:srgbClr val="000000"/>
                 </a:solidFill>
@@ -3617,7 +3419,7 @@
           <a:ln/>
           <a:extLst>
             <a:ext uri="{91240B29-F687-4f45-9708-019B960494DF}">
-              <a14:hiddenLine xmlns="" xmlns:a14="http://schemas.microsoft.com/office/drawing/2010/main" w="9525">
+              <a14:hiddenLine xmlns:a14="http://schemas.microsoft.com/office/drawing/2010/main" xmlns="" w="9525">
                 <a:solidFill>
                   <a:srgbClr val="000000"/>
                 </a:solidFill>
@@ -3889,7 +3691,7 @@
           <a:ln/>
           <a:extLst>
             <a:ext uri="{91240B29-F687-4f45-9708-019B960494DF}">
-              <a14:hiddenLine xmlns="" xmlns:a14="http://schemas.microsoft.com/office/drawing/2010/main" w="9525">
+              <a14:hiddenLine xmlns:a14="http://schemas.microsoft.com/office/drawing/2010/main" xmlns="" w="9525">
                 <a:solidFill>
                   <a:srgbClr val="000000"/>
                 </a:solidFill>
@@ -4169,7 +3971,7 @@
           <a:ln/>
           <a:extLst>
             <a:ext uri="{91240B29-F687-4f45-9708-019B960494DF}">
-              <a14:hiddenLine xmlns="" xmlns:a14="http://schemas.microsoft.com/office/drawing/2010/main" w="9525">
+              <a14:hiddenLine xmlns:a14="http://schemas.microsoft.com/office/drawing/2010/main" xmlns="" w="9525">
                 <a:solidFill>
                   <a:srgbClr val="000000"/>
                 </a:solidFill>
@@ -4789,7 +4591,7 @@
           <a:ln/>
           <a:extLst>
             <a:ext uri="{91240B29-F687-4f45-9708-019B960494DF}">
-              <a14:hiddenLine xmlns="" xmlns:a14="http://schemas.microsoft.com/office/drawing/2010/main" w="9525">
+              <a14:hiddenLine xmlns:a14="http://schemas.microsoft.com/office/drawing/2010/main" xmlns="" w="9525">
                 <a:solidFill>
                   <a:srgbClr val="000000"/>
                 </a:solidFill>
@@ -5125,7 +4927,7 @@
           <a:ln/>
           <a:extLst>
             <a:ext uri="{91240B29-F687-4f45-9708-019B960494DF}">
-              <a14:hiddenLine xmlns="" xmlns:a14="http://schemas.microsoft.com/office/drawing/2010/main" w="9525">
+              <a14:hiddenLine xmlns:a14="http://schemas.microsoft.com/office/drawing/2010/main" xmlns="" w="9525">
                 <a:solidFill>
                   <a:srgbClr val="000000"/>
                 </a:solidFill>
@@ -5599,7 +5401,7 @@
           <a:ln/>
           <a:extLst>
             <a:ext uri="{91240B29-F687-4f45-9708-019B960494DF}">
-              <a14:hiddenLine xmlns="" xmlns:a14="http://schemas.microsoft.com/office/drawing/2010/main" w="9525">
+              <a14:hiddenLine xmlns:a14="http://schemas.microsoft.com/office/drawing/2010/main" xmlns="" w="9525">
                 <a:solidFill>
                   <a:srgbClr val="000000"/>
                 </a:solidFill>
@@ -6022,7 +5824,7 @@
           <a:ln/>
           <a:extLst>
             <a:ext uri="{91240B29-F687-4f45-9708-019B960494DF}">
-              <a14:hiddenLine xmlns="" xmlns:a14="http://schemas.microsoft.com/office/drawing/2010/main" w="9525">
+              <a14:hiddenLine xmlns:a14="http://schemas.microsoft.com/office/drawing/2010/main" xmlns="" w="9525">
                 <a:solidFill>
                   <a:srgbClr val="000000"/>
                 </a:solidFill>
@@ -8229,6 +8031,35 @@
           </a:p>
         </p:txBody>
       </p:sp>
+      <p:pic>
+        <p:nvPicPr>
+          <p:cNvPr id="4" name="Afbeelding 3"/>
+          <p:cNvPicPr>
+            <a:picLocks noChangeAspect="1"/>
+          </p:cNvPicPr>
+          <p:nvPr/>
+        </p:nvPicPr>
+        <p:blipFill rotWithShape="1">
+          <a:blip r:embed="rId3">
+            <a:extLst>
+              <a:ext uri="{28A0092B-C50C-407E-A947-70E740481C1C}">
+                <a14:useLocalDpi xmlns:a14="http://schemas.microsoft.com/office/drawing/2010/main" val="0"/>
+              </a:ext>
+            </a:extLst>
+          </a:blip>
+          <a:srcRect t="6720" r="3320" b="7773"/>
+          <a:stretch/>
+        </p:blipFill>
+        <p:spPr>
+          <a:xfrm>
+            <a:off x="5707627" y="3421626"/>
+            <a:ext cx="5869858" cy="2920181"/>
+          </a:xfrm>
+          <a:prstGeom prst="rect">
+            <a:avLst/>
+          </a:prstGeom>
+        </p:spPr>
+      </p:pic>
     </p:spTree>
     <p:extLst>
       <p:ext uri="{BB962C8B-B14F-4D97-AF65-F5344CB8AC3E}">
@@ -8534,6 +8365,35 @@
           </a:p>
         </p:txBody>
       </p:sp>
+      <p:pic>
+        <p:nvPicPr>
+          <p:cNvPr id="4" name="Afbeelding 3"/>
+          <p:cNvPicPr>
+            <a:picLocks noChangeAspect="1"/>
+          </p:cNvPicPr>
+          <p:nvPr/>
+        </p:nvPicPr>
+        <p:blipFill rotWithShape="1">
+          <a:blip r:embed="rId3">
+            <a:extLst>
+              <a:ext uri="{28A0092B-C50C-407E-A947-70E740481C1C}">
+                <a14:useLocalDpi xmlns:a14="http://schemas.microsoft.com/office/drawing/2010/main" val="0"/>
+              </a:ext>
+            </a:extLst>
+          </a:blip>
+          <a:srcRect t="6305" r="50524" b="30039"/>
+          <a:stretch/>
+        </p:blipFill>
+        <p:spPr>
+          <a:xfrm>
+            <a:off x="6975987" y="3025402"/>
+            <a:ext cx="4704735" cy="3404894"/>
+          </a:xfrm>
+          <a:prstGeom prst="rect">
+            <a:avLst/>
+          </a:prstGeom>
+        </p:spPr>
+      </p:pic>
     </p:spTree>
     <p:extLst>
       <p:ext uri="{BB962C8B-B14F-4D97-AF65-F5344CB8AC3E}">

</xml_diff>